<commit_message>
ready for class 6
</commit_message>
<xml_diff>
--- a/INPRFM/clases.pptx
+++ b/INPRFM/clases.pptx
@@ -10,6 +10,7 @@
     <p:sldId id="258" r:id="rId4"/>
     <p:sldId id="259" r:id="rId5"/>
     <p:sldId id="260" r:id="rId6"/>
+    <p:sldId id="261" r:id="rId7"/>
   </p:sldIdLst>
   <p:sldSz cx="12192000" cy="6858000"/>
   <p:notesSz cx="6858000" cy="9144000"/>
@@ -108,13 +109,18 @@
       </a:defRPr>
     </a:lvl9pPr>
   </p:defaultTextStyle>
+  <p:extLst>
+    <p:ext uri="{EFAFB233-063F-42B5-8137-9DF3F51BA10A}">
+      <p15:sldGuideLst xmlns:p15="http://schemas.microsoft.com/office/powerpoint/2012/main"/>
+    </p:ext>
+  </p:extLst>
 </p:presentation>
 </file>
 
 <file path=ppt/revisionInfo.xml><?xml version="1.0" encoding="utf-8"?>
 <p1510:revInfo xmlns:a="http://schemas.openxmlformats.org/drawingml/2006/main" xmlns:r="http://schemas.openxmlformats.org/officeDocument/2006/relationships" xmlns:p1510="http://schemas.microsoft.com/office/powerpoint/2015/10/main">
   <p1510:revLst>
-    <p1510:client id="{74517CB5-F1BD-4581-9AF0-235D3EA82058}" v="15" dt="2025-06-17T19:43:04.633"/>
+    <p1510:client id="{74517CB5-F1BD-4581-9AF0-235D3EA82058}" v="16" dt="2025-06-23T19:09:24.674"/>
   </p1510:revLst>
 </p1510:revInfo>
 </file>
@@ -123,8 +129,8 @@
 <pc:chgInfo xmlns:a="http://schemas.openxmlformats.org/drawingml/2006/main" xmlns:r="http://schemas.openxmlformats.org/officeDocument/2006/relationships" xmlns:ac="http://schemas.microsoft.com/office/drawing/2013/main/command" xmlns:pc="http://schemas.microsoft.com/office/powerpoint/2013/main/command">
   <pc:docChgLst>
     <pc:chgData name="Castiello de Obeso, Santiago" userId="b4fc0b8e-1f0e-417a-8aad-015961d2398a" providerId="ADAL" clId="{74517CB5-F1BD-4581-9AF0-235D3EA82058}"/>
-    <pc:docChg chg="custSel addSld modSld">
-      <pc:chgData name="Castiello de Obeso, Santiago" userId="b4fc0b8e-1f0e-417a-8aad-015961d2398a" providerId="ADAL" clId="{74517CB5-F1BD-4581-9AF0-235D3EA82058}" dt="2025-06-17T19:45:12.656" v="727" actId="20577"/>
+    <pc:docChg chg="undo custSel addSld modSld">
+      <pc:chgData name="Castiello de Obeso, Santiago" userId="b4fc0b8e-1f0e-417a-8aad-015961d2398a" providerId="ADAL" clId="{74517CB5-F1BD-4581-9AF0-235D3EA82058}" dt="2025-06-23T19:10:36.154" v="798" actId="20577"/>
       <pc:docMkLst>
         <pc:docMk/>
       </pc:docMkLst>
@@ -134,22 +140,6 @@
           <pc:docMk/>
           <pc:sldMk cId="1848822846" sldId="256"/>
         </pc:sldMkLst>
-        <pc:spChg chg="del">
-          <ac:chgData name="Castiello de Obeso, Santiago" userId="b4fc0b8e-1f0e-417a-8aad-015961d2398a" providerId="ADAL" clId="{74517CB5-F1BD-4581-9AF0-235D3EA82058}" dt="2025-06-17T19:33:01.575" v="1" actId="478"/>
-          <ac:spMkLst>
-            <pc:docMk/>
-            <pc:sldMk cId="1848822846" sldId="256"/>
-            <ac:spMk id="2" creationId="{AF7F5C3E-1FC2-9EBC-E0D0-BA8B671BBE83}"/>
-          </ac:spMkLst>
-        </pc:spChg>
-        <pc:spChg chg="del">
-          <ac:chgData name="Castiello de Obeso, Santiago" userId="b4fc0b8e-1f0e-417a-8aad-015961d2398a" providerId="ADAL" clId="{74517CB5-F1BD-4581-9AF0-235D3EA82058}" dt="2025-06-17T19:33:01.575" v="1" actId="478"/>
-          <ac:spMkLst>
-            <pc:docMk/>
-            <pc:sldMk cId="1848822846" sldId="256"/>
-            <ac:spMk id="3" creationId="{E415E2D6-A23F-187D-C4FE-57FF29C77376}"/>
-          </ac:spMkLst>
-        </pc:spChg>
         <pc:spChg chg="add mod">
           <ac:chgData name="Castiello de Obeso, Santiago" userId="b4fc0b8e-1f0e-417a-8aad-015961d2398a" providerId="ADAL" clId="{74517CB5-F1BD-4581-9AF0-235D3EA82058}" dt="2025-06-17T19:33:29.939" v="13" actId="20577"/>
           <ac:spMkLst>
@@ -204,14 +194,6 @@
             <ac:spMk id="2" creationId="{81F41F46-F783-3EC5-EFC2-45D754066C98}"/>
           </ac:spMkLst>
         </pc:spChg>
-        <pc:spChg chg="add del mod">
-          <ac:chgData name="Castiello de Obeso, Santiago" userId="b4fc0b8e-1f0e-417a-8aad-015961d2398a" providerId="ADAL" clId="{74517CB5-F1BD-4581-9AF0-235D3EA82058}" dt="2025-06-17T19:43:01.091" v="582"/>
-          <ac:spMkLst>
-            <pc:docMk/>
-            <pc:sldMk cId="3648695623" sldId="258"/>
-            <ac:spMk id="3" creationId="{F97001AD-4466-B7A4-7170-6D892C17879B}"/>
-          </ac:spMkLst>
-        </pc:spChg>
         <pc:spChg chg="add mod">
           <ac:chgData name="Castiello de Obeso, Santiago" userId="b4fc0b8e-1f0e-417a-8aad-015961d2398a" providerId="ADAL" clId="{74517CB5-F1BD-4581-9AF0-235D3EA82058}" dt="2025-06-17T19:44:55.288" v="704" actId="20577"/>
           <ac:spMkLst>
@@ -245,7 +227,7 @@
         </pc:spChg>
       </pc:sldChg>
       <pc:sldChg chg="addSp modSp add mod">
-        <pc:chgData name="Castiello de Obeso, Santiago" userId="b4fc0b8e-1f0e-417a-8aad-015961d2398a" providerId="ADAL" clId="{74517CB5-F1BD-4581-9AF0-235D3EA82058}" dt="2025-06-17T19:35:58.065" v="155" actId="1076"/>
+        <pc:chgData name="Castiello de Obeso, Santiago" userId="b4fc0b8e-1f0e-417a-8aad-015961d2398a" providerId="ADAL" clId="{74517CB5-F1BD-4581-9AF0-235D3EA82058}" dt="2025-06-23T19:09:47.837" v="734" actId="6549"/>
         <pc:sldMkLst>
           <pc:docMk/>
           <pc:sldMk cId="3061262765" sldId="260"/>
@@ -259,11 +241,34 @@
           </ac:spMkLst>
         </pc:spChg>
         <pc:spChg chg="add mod">
-          <ac:chgData name="Castiello de Obeso, Santiago" userId="b4fc0b8e-1f0e-417a-8aad-015961d2398a" providerId="ADAL" clId="{74517CB5-F1BD-4581-9AF0-235D3EA82058}" dt="2025-06-17T19:35:58.065" v="155" actId="1076"/>
+          <ac:chgData name="Castiello de Obeso, Santiago" userId="b4fc0b8e-1f0e-417a-8aad-015961d2398a" providerId="ADAL" clId="{74517CB5-F1BD-4581-9AF0-235D3EA82058}" dt="2025-06-23T19:09:47.837" v="734" actId="6549"/>
           <ac:spMkLst>
             <pc:docMk/>
             <pc:sldMk cId="3061262765" sldId="260"/>
             <ac:spMk id="3" creationId="{BECFE4BE-8E8D-55FB-24B3-FD37B8B7233D}"/>
+          </ac:spMkLst>
+        </pc:spChg>
+      </pc:sldChg>
+      <pc:sldChg chg="modSp add mod">
+        <pc:chgData name="Castiello de Obeso, Santiago" userId="b4fc0b8e-1f0e-417a-8aad-015961d2398a" providerId="ADAL" clId="{74517CB5-F1BD-4581-9AF0-235D3EA82058}" dt="2025-06-23T19:10:36.154" v="798" actId="20577"/>
+        <pc:sldMkLst>
+          <pc:docMk/>
+          <pc:sldMk cId="2031539858" sldId="261"/>
+        </pc:sldMkLst>
+        <pc:spChg chg="mod">
+          <ac:chgData name="Castiello de Obeso, Santiago" userId="b4fc0b8e-1f0e-417a-8aad-015961d2398a" providerId="ADAL" clId="{74517CB5-F1BD-4581-9AF0-235D3EA82058}" dt="2025-06-23T19:09:50.811" v="736" actId="20577"/>
+          <ac:spMkLst>
+            <pc:docMk/>
+            <pc:sldMk cId="2031539858" sldId="261"/>
+            <ac:spMk id="2" creationId="{0F0DEB07-5587-8F29-1473-3EE31FF31E1A}"/>
+          </ac:spMkLst>
+        </pc:spChg>
+        <pc:spChg chg="mod">
+          <ac:chgData name="Castiello de Obeso, Santiago" userId="b4fc0b8e-1f0e-417a-8aad-015961d2398a" providerId="ADAL" clId="{74517CB5-F1BD-4581-9AF0-235D3EA82058}" dt="2025-06-23T19:10:36.154" v="798" actId="20577"/>
+          <ac:spMkLst>
+            <pc:docMk/>
+            <pc:sldMk cId="2031539858" sldId="261"/>
+            <ac:spMk id="3" creationId="{B6C2F386-D0B6-3370-F39F-751B78C9DD49}"/>
           </ac:spMkLst>
         </pc:spChg>
       </pc:sldChg>
@@ -421,7 +426,7 @@
           <a:p>
             <a:fld id="{A5A2E43D-75F9-4A35-BCDA-4E1676CFDAFA}" type="datetimeFigureOut">
               <a:rPr lang="en-GB" smtClean="0"/>
-              <a:t>17/06/2025</a:t>
+              <a:t>23/06/2025</a:t>
             </a:fld>
             <a:endParaRPr lang="en-GB"/>
           </a:p>
@@ -621,7 +626,7 @@
           <a:p>
             <a:fld id="{A5A2E43D-75F9-4A35-BCDA-4E1676CFDAFA}" type="datetimeFigureOut">
               <a:rPr lang="en-GB" smtClean="0"/>
-              <a:t>17/06/2025</a:t>
+              <a:t>23/06/2025</a:t>
             </a:fld>
             <a:endParaRPr lang="en-GB"/>
           </a:p>
@@ -831,7 +836,7 @@
           <a:p>
             <a:fld id="{A5A2E43D-75F9-4A35-BCDA-4E1676CFDAFA}" type="datetimeFigureOut">
               <a:rPr lang="en-GB" smtClean="0"/>
-              <a:t>17/06/2025</a:t>
+              <a:t>23/06/2025</a:t>
             </a:fld>
             <a:endParaRPr lang="en-GB"/>
           </a:p>
@@ -1031,7 +1036,7 @@
           <a:p>
             <a:fld id="{A5A2E43D-75F9-4A35-BCDA-4E1676CFDAFA}" type="datetimeFigureOut">
               <a:rPr lang="en-GB" smtClean="0"/>
-              <a:t>17/06/2025</a:t>
+              <a:t>23/06/2025</a:t>
             </a:fld>
             <a:endParaRPr lang="en-GB"/>
           </a:p>
@@ -1307,7 +1312,7 @@
           <a:p>
             <a:fld id="{A5A2E43D-75F9-4A35-BCDA-4E1676CFDAFA}" type="datetimeFigureOut">
               <a:rPr lang="en-GB" smtClean="0"/>
-              <a:t>17/06/2025</a:t>
+              <a:t>23/06/2025</a:t>
             </a:fld>
             <a:endParaRPr lang="en-GB"/>
           </a:p>
@@ -1575,7 +1580,7 @@
           <a:p>
             <a:fld id="{A5A2E43D-75F9-4A35-BCDA-4E1676CFDAFA}" type="datetimeFigureOut">
               <a:rPr lang="en-GB" smtClean="0"/>
-              <a:t>17/06/2025</a:t>
+              <a:t>23/06/2025</a:t>
             </a:fld>
             <a:endParaRPr lang="en-GB"/>
           </a:p>
@@ -1990,7 +1995,7 @@
           <a:p>
             <a:fld id="{A5A2E43D-75F9-4A35-BCDA-4E1676CFDAFA}" type="datetimeFigureOut">
               <a:rPr lang="en-GB" smtClean="0"/>
-              <a:t>17/06/2025</a:t>
+              <a:t>23/06/2025</a:t>
             </a:fld>
             <a:endParaRPr lang="en-GB"/>
           </a:p>
@@ -2132,7 +2137,7 @@
           <a:p>
             <a:fld id="{A5A2E43D-75F9-4A35-BCDA-4E1676CFDAFA}" type="datetimeFigureOut">
               <a:rPr lang="en-GB" smtClean="0"/>
-              <a:t>17/06/2025</a:t>
+              <a:t>23/06/2025</a:t>
             </a:fld>
             <a:endParaRPr lang="en-GB"/>
           </a:p>
@@ -2245,7 +2250,7 @@
           <a:p>
             <a:fld id="{A5A2E43D-75F9-4A35-BCDA-4E1676CFDAFA}" type="datetimeFigureOut">
               <a:rPr lang="en-GB" smtClean="0"/>
-              <a:t>17/06/2025</a:t>
+              <a:t>23/06/2025</a:t>
             </a:fld>
             <a:endParaRPr lang="en-GB"/>
           </a:p>
@@ -2558,7 +2563,7 @@
           <a:p>
             <a:fld id="{A5A2E43D-75F9-4A35-BCDA-4E1676CFDAFA}" type="datetimeFigureOut">
               <a:rPr lang="en-GB" smtClean="0"/>
-              <a:t>17/06/2025</a:t>
+              <a:t>23/06/2025</a:t>
             </a:fld>
             <a:endParaRPr lang="en-GB"/>
           </a:p>
@@ -2847,7 +2852,7 @@
           <a:p>
             <a:fld id="{A5A2E43D-75F9-4A35-BCDA-4E1676CFDAFA}" type="datetimeFigureOut">
               <a:rPr lang="en-GB" smtClean="0"/>
-              <a:t>17/06/2025</a:t>
+              <a:t>23/06/2025</a:t>
             </a:fld>
             <a:endParaRPr lang="en-GB"/>
           </a:p>
@@ -3090,7 +3095,7 @@
           <a:p>
             <a:fld id="{A5A2E43D-75F9-4A35-BCDA-4E1676CFDAFA}" type="datetimeFigureOut">
               <a:rPr lang="en-GB" smtClean="0"/>
-              <a:t>17/06/2025</a:t>
+              <a:t>23/06/2025</a:t>
             </a:fld>
             <a:endParaRPr lang="en-GB"/>
           </a:p>
@@ -4410,7 +4415,7 @@
         <p:spPr>
           <a:xfrm>
             <a:off x="3159747" y="2459504"/>
-            <a:ext cx="5872505" cy="1938992"/>
+            <a:ext cx="4464107" cy="461665"/>
           </a:xfrm>
           <a:prstGeom prst="rect">
             <a:avLst/>
@@ -4429,6 +4434,147 @@
             </a:pPr>
             <a:r>
               <a:rPr lang="en-GB" sz="2400" dirty="0" err="1"/>
+              <a:t>Interacciones</a:t>
+            </a:r>
+            <a:r>
+              <a:rPr lang="en-GB" sz="2400" dirty="0"/>
+              <a:t> y </a:t>
+            </a:r>
+            <a:r>
+              <a:rPr lang="en-GB" sz="2400" dirty="0" err="1"/>
+              <a:t>moderaciones</a:t>
+            </a:r>
+            <a:endParaRPr lang="en-GB" sz="2400" dirty="0"/>
+          </a:p>
+        </p:txBody>
+      </p:sp>
+    </p:spTree>
+    <p:extLst>
+      <p:ext uri="{BB962C8B-B14F-4D97-AF65-F5344CB8AC3E}">
+        <p14:creationId xmlns:p14="http://schemas.microsoft.com/office/powerpoint/2010/main" val="3061262765"/>
+      </p:ext>
+    </p:extLst>
+  </p:cSld>
+  <p:clrMapOvr>
+    <a:masterClrMapping/>
+  </p:clrMapOvr>
+</p:sld>
+</file>
+
+<file path=ppt/slides/slide6.xml><?xml version="1.0" encoding="utf-8"?>
+<p:sld xmlns:a="http://schemas.openxmlformats.org/drawingml/2006/main" xmlns:r="http://schemas.openxmlformats.org/officeDocument/2006/relationships" xmlns:p="http://schemas.openxmlformats.org/presentationml/2006/main">
+  <p:cSld>
+    <p:spTree>
+      <p:nvGrpSpPr>
+        <p:cNvPr id="1" name="">
+          <a:extLst>
+            <a:ext uri="{FF2B5EF4-FFF2-40B4-BE49-F238E27FC236}">
+              <a16:creationId xmlns:a16="http://schemas.microsoft.com/office/drawing/2014/main" id="{B4C61370-186A-EE8E-685B-36424C7258CA}"/>
+            </a:ext>
+          </a:extLst>
+        </p:cNvPr>
+        <p:cNvGrpSpPr/>
+        <p:nvPr/>
+      </p:nvGrpSpPr>
+      <p:grpSpPr>
+        <a:xfrm>
+          <a:off x="0" y="0"/>
+          <a:ext cx="0" cy="0"/>
+          <a:chOff x="0" y="0"/>
+          <a:chExt cx="0" cy="0"/>
+        </a:xfrm>
+      </p:grpSpPr>
+      <p:sp>
+        <p:nvSpPr>
+          <p:cNvPr id="2" name="Título 1">
+            <a:extLst>
+              <a:ext uri="{FF2B5EF4-FFF2-40B4-BE49-F238E27FC236}">
+                <a16:creationId xmlns:a16="http://schemas.microsoft.com/office/drawing/2014/main" id="{0F0DEB07-5587-8F29-1473-3EE31FF31E1A}"/>
+              </a:ext>
+            </a:extLst>
+          </p:cNvPr>
+          <p:cNvSpPr txBox="1">
+            <a:spLocks/>
+          </p:cNvSpPr>
+          <p:nvPr/>
+        </p:nvSpPr>
+        <p:spPr>
+          <a:xfrm>
+            <a:off x="0" y="0"/>
+            <a:ext cx="12192000" cy="612895"/>
+          </a:xfrm>
+          <a:prstGeom prst="rect">
+            <a:avLst/>
+          </a:prstGeom>
+        </p:spPr>
+        <p:txBody>
+          <a:bodyPr vert="horz" lIns="91440" tIns="45720" rIns="91440" bIns="45720" rtlCol="0" anchor="b">
+            <a:normAutofit lnSpcReduction="10000"/>
+          </a:bodyPr>
+          <a:lstStyle>
+            <a:lvl1pPr algn="ctr" defTabSz="914400" rtl="0" eaLnBrk="1" latinLnBrk="0" hangingPunct="1">
+              <a:lnSpc>
+                <a:spcPct val="90000"/>
+              </a:lnSpc>
+              <a:spcBef>
+                <a:spcPct val="0"/>
+              </a:spcBef>
+              <a:buNone/>
+              <a:defRPr sz="6000" kern="1200">
+                <a:solidFill>
+                  <a:schemeClr val="tx1"/>
+                </a:solidFill>
+                <a:latin typeface="+mj-lt"/>
+                <a:ea typeface="+mj-ea"/>
+                <a:cs typeface="+mj-cs"/>
+              </a:defRPr>
+            </a:lvl1pPr>
+          </a:lstStyle>
+          <a:p>
+            <a:r>
+              <a:rPr lang="es-MX" sz="4000" b="1" dirty="0">
+                <a:latin typeface="Times New Roman" panose="02020603050405020304" pitchFamily="18" charset="0"/>
+                <a:cs typeface="Times New Roman" panose="02020603050405020304" pitchFamily="18" charset="0"/>
+              </a:rPr>
+              <a:t>Clase 6</a:t>
+            </a:r>
+          </a:p>
+        </p:txBody>
+      </p:sp>
+      <p:sp>
+        <p:nvSpPr>
+          <p:cNvPr id="3" name="TextBox 2">
+            <a:extLst>
+              <a:ext uri="{FF2B5EF4-FFF2-40B4-BE49-F238E27FC236}">
+                <a16:creationId xmlns:a16="http://schemas.microsoft.com/office/drawing/2014/main" id="{B6C2F386-D0B6-3370-F39F-751B78C9DD49}"/>
+              </a:ext>
+            </a:extLst>
+          </p:cNvPr>
+          <p:cNvSpPr txBox="1"/>
+          <p:nvPr/>
+        </p:nvSpPr>
+        <p:spPr>
+          <a:xfrm>
+            <a:off x="3159747" y="2459504"/>
+            <a:ext cx="6137001" cy="1569660"/>
+          </a:xfrm>
+          <a:prstGeom prst="rect">
+            <a:avLst/>
+          </a:prstGeom>
+          <a:noFill/>
+        </p:spPr>
+        <p:txBody>
+          <a:bodyPr wrap="none" rtlCol="0">
+            <a:spAutoFit/>
+          </a:bodyPr>
+          <a:lstStyle/>
+          <a:p>
+            <a:pPr marL="285750" indent="-285750">
+              <a:buFont typeface="Arial" panose="020B0604020202020204" pitchFamily="34" charset="0"/>
+              <a:buChar char="•"/>
+            </a:pPr>
+            <a:r>
+              <a:rPr lang="en-GB" sz="2400" dirty="0" err="1"/>
               <a:t>Clarificacion</a:t>
             </a:r>
             <a:r>
@@ -4441,8 +4587,28 @@
             </a:r>
             <a:r>
               <a:rPr lang="en-GB" sz="2400" dirty="0"/>
-              <a:t> del Limite Central</a:t>
-            </a:r>
+              <a:t> del </a:t>
+            </a:r>
+            <a:r>
+              <a:rPr lang="en-GB" sz="2400"/>
+              <a:t>Limite Central y </a:t>
+            </a:r>
+            <a:br>
+              <a:rPr lang="en-GB" sz="2400"/>
+            </a:br>
+            <a:r>
+              <a:rPr lang="en-GB" sz="2400"/>
+              <a:t>Pruebas</a:t>
+            </a:r>
+            <a:r>
+              <a:rPr lang="en-GB" sz="2400" dirty="0"/>
+              <a:t> de </a:t>
+            </a:r>
+            <a:r>
+              <a:rPr lang="en-GB" sz="2400" dirty="0" err="1"/>
+              <a:t>normalidad</a:t>
+            </a:r>
+            <a:endParaRPr lang="en-GB" sz="2400" dirty="0"/>
           </a:p>
           <a:p>
             <a:pPr marL="285750" indent="-285750">
@@ -4458,50 +4624,27 @@
             </a:pPr>
             <a:r>
               <a:rPr lang="en-GB" sz="2400" dirty="0" err="1"/>
-              <a:t>Pruebas</a:t>
+              <a:t>Estructuras</a:t>
             </a:r>
             <a:r>
               <a:rPr lang="en-GB" sz="2400" dirty="0"/>
-              <a:t> de </a:t>
+              <a:t> </a:t>
             </a:r>
             <a:r>
               <a:rPr lang="en-GB" sz="2400" dirty="0" err="1"/>
-              <a:t>normalidad</a:t>
-            </a:r>
-            <a:endParaRPr lang="en-GB" sz="2400" dirty="0"/>
-          </a:p>
-          <a:p>
-            <a:pPr marL="285750" indent="-285750">
-              <a:buFont typeface="Arial" panose="020B0604020202020204" pitchFamily="34" charset="0"/>
-              <a:buChar char="•"/>
-            </a:pPr>
-            <a:endParaRPr lang="en-GB" sz="2400" dirty="0"/>
-          </a:p>
-          <a:p>
-            <a:pPr marL="285750" indent="-285750">
-              <a:buFont typeface="Arial" panose="020B0604020202020204" pitchFamily="34" charset="0"/>
-              <a:buChar char="•"/>
-            </a:pPr>
-            <a:r>
-              <a:rPr lang="en-GB" sz="2400" dirty="0" err="1"/>
-              <a:t>Interacciones</a:t>
+              <a:t>Agrupadas</a:t>
             </a:r>
             <a:r>
               <a:rPr lang="en-GB" sz="2400" dirty="0"/>
-              <a:t> y </a:t>
-            </a:r>
-            <a:r>
-              <a:rPr lang="en-GB" sz="2400" dirty="0" err="1"/>
-              <a:t>moderaciones</a:t>
-            </a:r>
-            <a:endParaRPr lang="en-GB" sz="2400" dirty="0"/>
+              <a:t> (nested)</a:t>
+            </a:r>
           </a:p>
         </p:txBody>
       </p:sp>
     </p:spTree>
     <p:extLst>
       <p:ext uri="{BB962C8B-B14F-4D97-AF65-F5344CB8AC3E}">
-        <p14:creationId xmlns:p14="http://schemas.microsoft.com/office/powerpoint/2010/main" val="3061262765"/>
+        <p14:creationId xmlns:p14="http://schemas.microsoft.com/office/powerpoint/2010/main" val="2031539858"/>
       </p:ext>
     </p:extLst>
   </p:cSld>

</xml_diff>